<commit_message>
add personal into the tree
</commit_message>
<xml_diff>
--- a/LiuWenjia/liuwenjia_intro.pptx
+++ b/LiuWenjia/liuwenjia_intro.pptx
@@ -483,6 +483,7 @@
     </c:plotArea>
     <c:plotVisOnly val="1"/>
     <c:dispBlanksAs val="gap"/>
+    <c:showDLblsOverMax val="0"/>
     <c:extLst>
       <c:ext xmlns:c16r3="http://schemas.microsoft.com/office/drawing/2017/03/chart" uri="{56B9EC1D-385E-4148-901F-78D8002777C0}">
         <c16r3:dataDisplayOptions16>
@@ -490,7 +491,6 @@
         </c16r3:dataDisplayOptions16>
       </c:ext>
     </c:extLst>
-    <c:showDLblsOverMax val="0"/>
   </c:chart>
   <c:spPr>
     <a:noFill/>
@@ -1932,12 +1932,22 @@
       </dgm:t>
     </dgm:pt>
     <dgm:pt modelId="{7F18F1C7-64D6-41A1-8F9A-C4BD14DDC8DD}">
-      <dgm:prSet phldrT="[文本]" phldr="1"/>
+      <dgm:prSet phldrT="[文本]"/>
       <dgm:spPr/>
       <dgm:t>
         <a:bodyPr/>
         <a:lstStyle/>
         <a:p>
+          <a:r>
+            <a:rPr lang="en-US" altLang="zh-CN" dirty="0" smtClean="0">
+              <a:solidFill>
+                <a:schemeClr val="bg2">
+                  <a:lumMod val="95000"/>
+                </a:schemeClr>
+              </a:solidFill>
+            </a:rPr>
+            <a:t>An algorithm to diagnose skin cancer </a:t>
+          </a:r>
           <a:endParaRPr lang="zh-CN" altLang="en-US" dirty="0"/>
         </a:p>
       </dgm:t>
@@ -1965,13 +1975,23 @@
       </dgm:t>
     </dgm:pt>
     <dgm:pt modelId="{E94AF387-BD98-47BA-8CED-E6E8F70BDAE9}">
-      <dgm:prSet phldrT="[文本]" phldr="1"/>
+      <dgm:prSet phldrT="[文本]"/>
       <dgm:spPr/>
       <dgm:t>
         <a:bodyPr/>
         <a:lstStyle/>
         <a:p>
-          <a:endParaRPr lang="zh-CN" altLang="en-US"/>
+          <a:r>
+            <a:rPr lang="en-US" altLang="zh-CN" dirty="0" smtClean="0">
+              <a:solidFill>
+                <a:schemeClr val="bg2">
+                  <a:lumMod val="95000"/>
+                </a:schemeClr>
+              </a:solidFill>
+            </a:rPr>
+            <a:t>A deep learning algorithm to observe biopsy</a:t>
+          </a:r>
+          <a:endParaRPr lang="zh-CN" altLang="en-US" dirty="0"/>
         </a:p>
       </dgm:t>
     </dgm:pt>
@@ -2242,6 +2262,13 @@
         </dgm:presLayoutVars>
       </dgm:prSet>
       <dgm:spPr/>
+      <dgm:t>
+        <a:bodyPr/>
+        <a:lstStyle/>
+        <a:p>
+          <a:endParaRPr lang="zh-CN" altLang="en-US"/>
+        </a:p>
+      </dgm:t>
     </dgm:pt>
     <dgm:pt modelId="{AF338577-0C0E-4B98-B7AB-901DF3BE9B79}" type="pres">
       <dgm:prSet presAssocID="{CE7183E0-FC6D-482D-BBAA-3689A7D63D08}" presName="root1" presStyleCnt="0"/>
@@ -2254,6 +2281,13 @@
         </dgm:presLayoutVars>
       </dgm:prSet>
       <dgm:spPr/>
+      <dgm:t>
+        <a:bodyPr/>
+        <a:lstStyle/>
+        <a:p>
+          <a:endParaRPr lang="zh-CN" altLang="en-US"/>
+        </a:p>
+      </dgm:t>
     </dgm:pt>
     <dgm:pt modelId="{B2553A53-8B7C-4A9C-8965-1592D34069B8}" type="pres">
       <dgm:prSet presAssocID="{CE7183E0-FC6D-482D-BBAA-3689A7D63D08}" presName="level2hierChild" presStyleCnt="0"/>
@@ -2262,10 +2296,24 @@
     <dgm:pt modelId="{C9693C17-A025-4304-B2C2-786DF385B7D5}" type="pres">
       <dgm:prSet presAssocID="{2845D49D-8B8B-49FC-8CF9-5D029172FE8B}" presName="conn2-1" presStyleLbl="parChTrans1D2" presStyleIdx="0" presStyleCnt="3"/>
       <dgm:spPr/>
+      <dgm:t>
+        <a:bodyPr/>
+        <a:lstStyle/>
+        <a:p>
+          <a:endParaRPr lang="zh-CN" altLang="en-US"/>
+        </a:p>
+      </dgm:t>
     </dgm:pt>
     <dgm:pt modelId="{95077FC6-FE2C-4468-B2E1-AD8DB8B81A60}" type="pres">
       <dgm:prSet presAssocID="{2845D49D-8B8B-49FC-8CF9-5D029172FE8B}" presName="connTx" presStyleLbl="parChTrans1D2" presStyleIdx="0" presStyleCnt="3"/>
       <dgm:spPr/>
+      <dgm:t>
+        <a:bodyPr/>
+        <a:lstStyle/>
+        <a:p>
+          <a:endParaRPr lang="zh-CN" altLang="en-US"/>
+        </a:p>
+      </dgm:t>
     </dgm:pt>
     <dgm:pt modelId="{A529D4D1-CCFF-4CE4-A9F9-97465F10D3B0}" type="pres">
       <dgm:prSet presAssocID="{FD1EE688-04C6-4B9C-BBF4-0AFA3A5DC1AB}" presName="root2" presStyleCnt="0"/>
@@ -2278,6 +2326,13 @@
         </dgm:presLayoutVars>
       </dgm:prSet>
       <dgm:spPr/>
+      <dgm:t>
+        <a:bodyPr/>
+        <a:lstStyle/>
+        <a:p>
+          <a:endParaRPr lang="zh-CN" altLang="en-US"/>
+        </a:p>
+      </dgm:t>
     </dgm:pt>
     <dgm:pt modelId="{7FBE41EA-FDDC-45E8-8371-B0000FD44CAF}" type="pres">
       <dgm:prSet presAssocID="{FD1EE688-04C6-4B9C-BBF4-0AFA3A5DC1AB}" presName="level3hierChild" presStyleCnt="0"/>
@@ -2286,10 +2341,24 @@
     <dgm:pt modelId="{724109EC-7AA4-405A-A907-96E43FD46EDA}" type="pres">
       <dgm:prSet presAssocID="{42265CA6-5503-4328-83B4-67FBEE37AF39}" presName="conn2-1" presStyleLbl="parChTrans1D3" presStyleIdx="0" presStyleCnt="6"/>
       <dgm:spPr/>
+      <dgm:t>
+        <a:bodyPr/>
+        <a:lstStyle/>
+        <a:p>
+          <a:endParaRPr lang="zh-CN" altLang="en-US"/>
+        </a:p>
+      </dgm:t>
     </dgm:pt>
     <dgm:pt modelId="{C97AE997-3481-42E1-9835-076702BC81A6}" type="pres">
       <dgm:prSet presAssocID="{42265CA6-5503-4328-83B4-67FBEE37AF39}" presName="connTx" presStyleLbl="parChTrans1D3" presStyleIdx="0" presStyleCnt="6"/>
       <dgm:spPr/>
+      <dgm:t>
+        <a:bodyPr/>
+        <a:lstStyle/>
+        <a:p>
+          <a:endParaRPr lang="zh-CN" altLang="en-US"/>
+        </a:p>
+      </dgm:t>
     </dgm:pt>
     <dgm:pt modelId="{11DA982D-371A-439B-A256-51749B5099EF}" type="pres">
       <dgm:prSet presAssocID="{7F18F1C7-64D6-41A1-8F9A-C4BD14DDC8DD}" presName="root2" presStyleCnt="0"/>
@@ -2302,6 +2371,13 @@
         </dgm:presLayoutVars>
       </dgm:prSet>
       <dgm:spPr/>
+      <dgm:t>
+        <a:bodyPr/>
+        <a:lstStyle/>
+        <a:p>
+          <a:endParaRPr lang="zh-CN" altLang="en-US"/>
+        </a:p>
+      </dgm:t>
     </dgm:pt>
     <dgm:pt modelId="{C99334D3-4657-4CD5-9FD0-1536AEEC0A38}" type="pres">
       <dgm:prSet presAssocID="{7F18F1C7-64D6-41A1-8F9A-C4BD14DDC8DD}" presName="level3hierChild" presStyleCnt="0"/>
@@ -2310,10 +2386,24 @@
     <dgm:pt modelId="{4E8AA63B-77B3-4B4E-9ACE-A4694C393D1F}" type="pres">
       <dgm:prSet presAssocID="{F2660733-B19B-4C8B-ADEC-444625FE1959}" presName="conn2-1" presStyleLbl="parChTrans1D3" presStyleIdx="1" presStyleCnt="6"/>
       <dgm:spPr/>
+      <dgm:t>
+        <a:bodyPr/>
+        <a:lstStyle/>
+        <a:p>
+          <a:endParaRPr lang="zh-CN" altLang="en-US"/>
+        </a:p>
+      </dgm:t>
     </dgm:pt>
     <dgm:pt modelId="{60725401-FD4B-42F1-B183-EFE9C6805CF3}" type="pres">
       <dgm:prSet presAssocID="{F2660733-B19B-4C8B-ADEC-444625FE1959}" presName="connTx" presStyleLbl="parChTrans1D3" presStyleIdx="1" presStyleCnt="6"/>
       <dgm:spPr/>
+      <dgm:t>
+        <a:bodyPr/>
+        <a:lstStyle/>
+        <a:p>
+          <a:endParaRPr lang="zh-CN" altLang="en-US"/>
+        </a:p>
+      </dgm:t>
     </dgm:pt>
     <dgm:pt modelId="{D895EA66-1279-4A9D-96B2-F5855BAF0C09}" type="pres">
       <dgm:prSet presAssocID="{E94AF387-BD98-47BA-8CED-E6E8F70BDAE9}" presName="root2" presStyleCnt="0"/>
@@ -2326,6 +2416,13 @@
         </dgm:presLayoutVars>
       </dgm:prSet>
       <dgm:spPr/>
+      <dgm:t>
+        <a:bodyPr/>
+        <a:lstStyle/>
+        <a:p>
+          <a:endParaRPr lang="zh-CN" altLang="en-US"/>
+        </a:p>
+      </dgm:t>
     </dgm:pt>
     <dgm:pt modelId="{692ED6DF-C47C-4DC1-BB2B-2C57DFC7B1F2}" type="pres">
       <dgm:prSet presAssocID="{E94AF387-BD98-47BA-8CED-E6E8F70BDAE9}" presName="level3hierChild" presStyleCnt="0"/>
@@ -2334,10 +2431,24 @@
     <dgm:pt modelId="{A0542B67-BBCD-4FCC-8292-AE1B6154BAA6}" type="pres">
       <dgm:prSet presAssocID="{4389E12C-9709-407B-8408-71774DA065A9}" presName="conn2-1" presStyleLbl="parChTrans1D2" presStyleIdx="1" presStyleCnt="3"/>
       <dgm:spPr/>
+      <dgm:t>
+        <a:bodyPr/>
+        <a:lstStyle/>
+        <a:p>
+          <a:endParaRPr lang="zh-CN" altLang="en-US"/>
+        </a:p>
+      </dgm:t>
     </dgm:pt>
     <dgm:pt modelId="{E03F2445-46A1-4A36-AA0B-2A91C15498A4}" type="pres">
       <dgm:prSet presAssocID="{4389E12C-9709-407B-8408-71774DA065A9}" presName="connTx" presStyleLbl="parChTrans1D2" presStyleIdx="1" presStyleCnt="3"/>
       <dgm:spPr/>
+      <dgm:t>
+        <a:bodyPr/>
+        <a:lstStyle/>
+        <a:p>
+          <a:endParaRPr lang="zh-CN" altLang="en-US"/>
+        </a:p>
+      </dgm:t>
     </dgm:pt>
     <dgm:pt modelId="{F27EF546-A99F-498B-96D6-ACACC3244D2C}" type="pres">
       <dgm:prSet presAssocID="{9707381C-34A2-465B-8DC7-DCE55ABDB5EB}" presName="root2" presStyleCnt="0"/>
@@ -2350,6 +2461,13 @@
         </dgm:presLayoutVars>
       </dgm:prSet>
       <dgm:spPr/>
+      <dgm:t>
+        <a:bodyPr/>
+        <a:lstStyle/>
+        <a:p>
+          <a:endParaRPr lang="zh-CN" altLang="en-US"/>
+        </a:p>
+      </dgm:t>
     </dgm:pt>
     <dgm:pt modelId="{DD858749-7D5D-4399-AE71-494A81ADDD85}" type="pres">
       <dgm:prSet presAssocID="{9707381C-34A2-465B-8DC7-DCE55ABDB5EB}" presName="level3hierChild" presStyleCnt="0"/>
@@ -2358,10 +2476,24 @@
     <dgm:pt modelId="{D01FFC91-2FF3-476C-BC20-FDFA916FA11C}" type="pres">
       <dgm:prSet presAssocID="{BEB9F2E8-6AD7-48EF-B109-54827D9B5320}" presName="conn2-1" presStyleLbl="parChTrans1D3" presStyleIdx="2" presStyleCnt="6"/>
       <dgm:spPr/>
+      <dgm:t>
+        <a:bodyPr/>
+        <a:lstStyle/>
+        <a:p>
+          <a:endParaRPr lang="zh-CN" altLang="en-US"/>
+        </a:p>
+      </dgm:t>
     </dgm:pt>
     <dgm:pt modelId="{2B114A4A-DEE2-4DEE-BC6D-E67B7CD79C39}" type="pres">
       <dgm:prSet presAssocID="{BEB9F2E8-6AD7-48EF-B109-54827D9B5320}" presName="connTx" presStyleLbl="parChTrans1D3" presStyleIdx="2" presStyleCnt="6"/>
       <dgm:spPr/>
+      <dgm:t>
+        <a:bodyPr/>
+        <a:lstStyle/>
+        <a:p>
+          <a:endParaRPr lang="zh-CN" altLang="en-US"/>
+        </a:p>
+      </dgm:t>
     </dgm:pt>
     <dgm:pt modelId="{46F071DC-1357-4A7B-9BE5-E2B7A21A2553}" type="pres">
       <dgm:prSet presAssocID="{7C7979A5-9647-45C2-9B77-E68BA3E128C5}" presName="root2" presStyleCnt="0"/>
@@ -2374,6 +2506,13 @@
         </dgm:presLayoutVars>
       </dgm:prSet>
       <dgm:spPr/>
+      <dgm:t>
+        <a:bodyPr/>
+        <a:lstStyle/>
+        <a:p>
+          <a:endParaRPr lang="zh-CN" altLang="en-US"/>
+        </a:p>
+      </dgm:t>
     </dgm:pt>
     <dgm:pt modelId="{64465032-F508-42BF-A0BF-B1FB5C22319A}" type="pres">
       <dgm:prSet presAssocID="{7C7979A5-9647-45C2-9B77-E68BA3E128C5}" presName="level3hierChild" presStyleCnt="0"/>
@@ -2382,10 +2521,24 @@
     <dgm:pt modelId="{D1C8A5F7-9AC5-4014-8411-66FC3A986915}" type="pres">
       <dgm:prSet presAssocID="{F7357B37-0413-4030-87F3-C6B5E9FC5B98}" presName="conn2-1" presStyleLbl="parChTrans1D3" presStyleIdx="3" presStyleCnt="6"/>
       <dgm:spPr/>
+      <dgm:t>
+        <a:bodyPr/>
+        <a:lstStyle/>
+        <a:p>
+          <a:endParaRPr lang="zh-CN" altLang="en-US"/>
+        </a:p>
+      </dgm:t>
     </dgm:pt>
     <dgm:pt modelId="{ECC875B4-871B-4168-898B-298509B5EB54}" type="pres">
       <dgm:prSet presAssocID="{F7357B37-0413-4030-87F3-C6B5E9FC5B98}" presName="connTx" presStyleLbl="parChTrans1D3" presStyleIdx="3" presStyleCnt="6"/>
       <dgm:spPr/>
+      <dgm:t>
+        <a:bodyPr/>
+        <a:lstStyle/>
+        <a:p>
+          <a:endParaRPr lang="zh-CN" altLang="en-US"/>
+        </a:p>
+      </dgm:t>
     </dgm:pt>
     <dgm:pt modelId="{291A96F3-CE54-4273-AF4C-5DDD734B7E63}" type="pres">
       <dgm:prSet presAssocID="{ADBDA4B8-1CC5-4C95-999B-0B604C70B25C}" presName="root2" presStyleCnt="0"/>
@@ -2398,6 +2551,13 @@
         </dgm:presLayoutVars>
       </dgm:prSet>
       <dgm:spPr/>
+      <dgm:t>
+        <a:bodyPr/>
+        <a:lstStyle/>
+        <a:p>
+          <a:endParaRPr lang="zh-CN" altLang="en-US"/>
+        </a:p>
+      </dgm:t>
     </dgm:pt>
     <dgm:pt modelId="{A3B7C561-15EB-4A96-9E8D-968B71452D7D}" type="pres">
       <dgm:prSet presAssocID="{ADBDA4B8-1CC5-4C95-999B-0B604C70B25C}" presName="level3hierChild" presStyleCnt="0"/>
@@ -2406,10 +2566,24 @@
     <dgm:pt modelId="{5DE9C18F-828A-4F28-821F-FF3CB0C2E9FE}" type="pres">
       <dgm:prSet presAssocID="{B91E6EC0-8555-4AD4-8850-1CF60EA014EC}" presName="conn2-1" presStyleLbl="parChTrans1D2" presStyleIdx="2" presStyleCnt="3"/>
       <dgm:spPr/>
+      <dgm:t>
+        <a:bodyPr/>
+        <a:lstStyle/>
+        <a:p>
+          <a:endParaRPr lang="zh-CN" altLang="en-US"/>
+        </a:p>
+      </dgm:t>
     </dgm:pt>
     <dgm:pt modelId="{94765D40-7092-49D3-8469-BB86B82499D0}" type="pres">
       <dgm:prSet presAssocID="{B91E6EC0-8555-4AD4-8850-1CF60EA014EC}" presName="connTx" presStyleLbl="parChTrans1D2" presStyleIdx="2" presStyleCnt="3"/>
       <dgm:spPr/>
+      <dgm:t>
+        <a:bodyPr/>
+        <a:lstStyle/>
+        <a:p>
+          <a:endParaRPr lang="zh-CN" altLang="en-US"/>
+        </a:p>
+      </dgm:t>
     </dgm:pt>
     <dgm:pt modelId="{FE5764A7-3414-44EA-ADEF-4A1D586299C5}" type="pres">
       <dgm:prSet presAssocID="{6B547BE3-08F4-403C-8E93-8CE9C9C3426C}" presName="root2" presStyleCnt="0"/>
@@ -2422,6 +2596,13 @@
         </dgm:presLayoutVars>
       </dgm:prSet>
       <dgm:spPr/>
+      <dgm:t>
+        <a:bodyPr/>
+        <a:lstStyle/>
+        <a:p>
+          <a:endParaRPr lang="zh-CN" altLang="en-US"/>
+        </a:p>
+      </dgm:t>
     </dgm:pt>
     <dgm:pt modelId="{A931EB4D-9335-4F14-8B91-969B1EBF0044}" type="pres">
       <dgm:prSet presAssocID="{6B547BE3-08F4-403C-8E93-8CE9C9C3426C}" presName="level3hierChild" presStyleCnt="0"/>
@@ -2430,10 +2611,24 @@
     <dgm:pt modelId="{451D81E7-5C40-4FCA-BD7C-D723378D6FCB}" type="pres">
       <dgm:prSet presAssocID="{3216ED5A-322F-48C5-A5D8-B4CE2447C8CA}" presName="conn2-1" presStyleLbl="parChTrans1D3" presStyleIdx="4" presStyleCnt="6"/>
       <dgm:spPr/>
+      <dgm:t>
+        <a:bodyPr/>
+        <a:lstStyle/>
+        <a:p>
+          <a:endParaRPr lang="zh-CN" altLang="en-US"/>
+        </a:p>
+      </dgm:t>
     </dgm:pt>
     <dgm:pt modelId="{0002987A-1CBC-4917-9141-161305AD6209}" type="pres">
       <dgm:prSet presAssocID="{3216ED5A-322F-48C5-A5D8-B4CE2447C8CA}" presName="connTx" presStyleLbl="parChTrans1D3" presStyleIdx="4" presStyleCnt="6"/>
       <dgm:spPr/>
+      <dgm:t>
+        <a:bodyPr/>
+        <a:lstStyle/>
+        <a:p>
+          <a:endParaRPr lang="zh-CN" altLang="en-US"/>
+        </a:p>
+      </dgm:t>
     </dgm:pt>
     <dgm:pt modelId="{1B0D27B2-8F03-4ED3-BB01-D1C58AAC8B1B}" type="pres">
       <dgm:prSet presAssocID="{3CBF230D-AE9D-45F9-B1E3-101B3E987F27}" presName="root2" presStyleCnt="0"/>
@@ -2446,6 +2641,13 @@
         </dgm:presLayoutVars>
       </dgm:prSet>
       <dgm:spPr/>
+      <dgm:t>
+        <a:bodyPr/>
+        <a:lstStyle/>
+        <a:p>
+          <a:endParaRPr lang="zh-CN" altLang="en-US"/>
+        </a:p>
+      </dgm:t>
     </dgm:pt>
     <dgm:pt modelId="{7E9F68F7-BE1B-40DB-91D4-0288B004AC8C}" type="pres">
       <dgm:prSet presAssocID="{3CBF230D-AE9D-45F9-B1E3-101B3E987F27}" presName="level3hierChild" presStyleCnt="0"/>
@@ -2454,10 +2656,24 @@
     <dgm:pt modelId="{440453D6-FD36-4A5E-8970-9AD4C4BEA5F5}" type="pres">
       <dgm:prSet presAssocID="{F7F956B1-0B4F-4BD2-B0FE-7CE93E5F076E}" presName="conn2-1" presStyleLbl="parChTrans1D3" presStyleIdx="5" presStyleCnt="6"/>
       <dgm:spPr/>
+      <dgm:t>
+        <a:bodyPr/>
+        <a:lstStyle/>
+        <a:p>
+          <a:endParaRPr lang="zh-CN" altLang="en-US"/>
+        </a:p>
+      </dgm:t>
     </dgm:pt>
     <dgm:pt modelId="{70C472DB-8543-4760-B2F5-E310B1D77771}" type="pres">
       <dgm:prSet presAssocID="{F7F956B1-0B4F-4BD2-B0FE-7CE93E5F076E}" presName="connTx" presStyleLbl="parChTrans1D3" presStyleIdx="5" presStyleCnt="6"/>
       <dgm:spPr/>
+      <dgm:t>
+        <a:bodyPr/>
+        <a:lstStyle/>
+        <a:p>
+          <a:endParaRPr lang="zh-CN" altLang="en-US"/>
+        </a:p>
+      </dgm:t>
     </dgm:pt>
     <dgm:pt modelId="{E45C87BC-E63A-430D-83BB-791219B3520C}" type="pres">
       <dgm:prSet presAssocID="{AFB89466-502F-48B5-8B1B-F4212116EB70}" presName="root2" presStyleCnt="0"/>
@@ -2470,6 +2686,13 @@
         </dgm:presLayoutVars>
       </dgm:prSet>
       <dgm:spPr/>
+      <dgm:t>
+        <a:bodyPr/>
+        <a:lstStyle/>
+        <a:p>
+          <a:endParaRPr lang="zh-CN" altLang="en-US"/>
+        </a:p>
+      </dgm:t>
     </dgm:pt>
     <dgm:pt modelId="{34BEC561-774F-4391-A1DF-3A4DEDCEA51D}" type="pres">
       <dgm:prSet presAssocID="{AFB89466-502F-48B5-8B1B-F4212116EB70}" presName="level3hierChild" presStyleCnt="0"/>
@@ -2477,45 +2700,45 @@
     </dgm:pt>
   </dgm:ptLst>
   <dgm:cxnLst>
+    <dgm:cxn modelId="{48373DB9-B20D-4B9B-9DD7-F6C2D7AB1D21}" srcId="{6B547BE3-08F4-403C-8E93-8CE9C9C3426C}" destId="{AFB89466-502F-48B5-8B1B-F4212116EB70}" srcOrd="1" destOrd="0" parTransId="{F7F956B1-0B4F-4BD2-B0FE-7CE93E5F076E}" sibTransId="{E669B3DD-6E4C-4F23-9C5E-3DAC39CA70A0}"/>
+    <dgm:cxn modelId="{EDE5A824-DD91-4B92-9B18-1233B537093F}" type="presOf" srcId="{BEB9F2E8-6AD7-48EF-B109-54827D9B5320}" destId="{2B114A4A-DEE2-4DEE-BC6D-E67B7CD79C39}" srcOrd="1" destOrd="0" presId="urn:microsoft.com/office/officeart/2005/8/layout/hierarchy2"/>
+    <dgm:cxn modelId="{2C05D639-8E70-435C-8A20-A974920A2B5E}" type="presOf" srcId="{42265CA6-5503-4328-83B4-67FBEE37AF39}" destId="{C97AE997-3481-42E1-9835-076702BC81A6}" srcOrd="1" destOrd="0" presId="urn:microsoft.com/office/officeart/2005/8/layout/hierarchy2"/>
+    <dgm:cxn modelId="{86D44419-11AA-4A3E-A495-83844467DDC0}" type="presOf" srcId="{F7F956B1-0B4F-4BD2-B0FE-7CE93E5F076E}" destId="{70C472DB-8543-4760-B2F5-E310B1D77771}" srcOrd="1" destOrd="0" presId="urn:microsoft.com/office/officeart/2005/8/layout/hierarchy2"/>
+    <dgm:cxn modelId="{F6533638-EB49-4EA5-B2FC-2D7926E6CE06}" srcId="{CE7183E0-FC6D-482D-BBAA-3689A7D63D08}" destId="{9707381C-34A2-465B-8DC7-DCE55ABDB5EB}" srcOrd="1" destOrd="0" parTransId="{4389E12C-9709-407B-8408-71774DA065A9}" sibTransId="{673AA035-C8BA-4786-B5EC-D26501BA52F6}"/>
+    <dgm:cxn modelId="{D80D982E-074D-4F63-9EE4-81431C475D9D}" type="presOf" srcId="{7F18F1C7-64D6-41A1-8F9A-C4BD14DDC8DD}" destId="{7D428C10-1AC0-4BE3-A697-ED6BD860F5CA}" srcOrd="0" destOrd="0" presId="urn:microsoft.com/office/officeart/2005/8/layout/hierarchy2"/>
+    <dgm:cxn modelId="{77D0C562-5A47-4BEA-AA78-66A83EA862AF}" type="presOf" srcId="{AFB89466-502F-48B5-8B1B-F4212116EB70}" destId="{BBF263CD-06CB-4292-83EB-8C00C91205C9}" srcOrd="0" destOrd="0" presId="urn:microsoft.com/office/officeart/2005/8/layout/hierarchy2"/>
+    <dgm:cxn modelId="{8274D196-E59F-4422-A514-004D7CE5185C}" type="presOf" srcId="{3216ED5A-322F-48C5-A5D8-B4CE2447C8CA}" destId="{451D81E7-5C40-4FCA-BD7C-D723378D6FCB}" srcOrd="0" destOrd="0" presId="urn:microsoft.com/office/officeart/2005/8/layout/hierarchy2"/>
+    <dgm:cxn modelId="{6CAE4015-57B5-456A-A866-16880F3B93ED}" type="presOf" srcId="{B91E6EC0-8555-4AD4-8850-1CF60EA014EC}" destId="{5DE9C18F-828A-4F28-821F-FF3CB0C2E9FE}" srcOrd="0" destOrd="0" presId="urn:microsoft.com/office/officeart/2005/8/layout/hierarchy2"/>
+    <dgm:cxn modelId="{F7F7704E-E4C0-40A5-9A95-4F969E0569BF}" srcId="{9707381C-34A2-465B-8DC7-DCE55ABDB5EB}" destId="{7C7979A5-9647-45C2-9B77-E68BA3E128C5}" srcOrd="0" destOrd="0" parTransId="{BEB9F2E8-6AD7-48EF-B109-54827D9B5320}" sibTransId="{74EEF1C3-79C8-473B-9458-E58DC3D89447}"/>
+    <dgm:cxn modelId="{3E7BF921-6A68-428F-9CFF-6BE6A4F646E8}" srcId="{6B547BE3-08F4-403C-8E93-8CE9C9C3426C}" destId="{3CBF230D-AE9D-45F9-B1E3-101B3E987F27}" srcOrd="0" destOrd="0" parTransId="{3216ED5A-322F-48C5-A5D8-B4CE2447C8CA}" sibTransId="{55032BA6-0D0C-4136-B13F-9B0D26A8CED9}"/>
+    <dgm:cxn modelId="{2472EBC8-1D53-406C-B663-7A802F5B27C3}" srcId="{FD1EE688-04C6-4B9C-BBF4-0AFA3A5DC1AB}" destId="{7F18F1C7-64D6-41A1-8F9A-C4BD14DDC8DD}" srcOrd="0" destOrd="0" parTransId="{42265CA6-5503-4328-83B4-67FBEE37AF39}" sibTransId="{0961F8A6-DF62-45B2-8A8B-64DE7098755B}"/>
+    <dgm:cxn modelId="{2AE0F42D-BEFE-4781-811E-EFF4FE5D26C3}" type="presOf" srcId="{6B547BE3-08F4-403C-8E93-8CE9C9C3426C}" destId="{B709CC8E-B85E-4857-A489-3E9FF83B1A51}" srcOrd="0" destOrd="0" presId="urn:microsoft.com/office/officeart/2005/8/layout/hierarchy2"/>
+    <dgm:cxn modelId="{0464B431-8205-44F1-8723-9DE005B5C3D5}" type="presOf" srcId="{FD1EE688-04C6-4B9C-BBF4-0AFA3A5DC1AB}" destId="{B2BB8CBF-F428-42F5-A604-AAB92BB27DD7}" srcOrd="0" destOrd="0" presId="urn:microsoft.com/office/officeart/2005/8/layout/hierarchy2"/>
     <dgm:cxn modelId="{1C8DF800-A2EB-43F7-A177-95C07817248B}" type="presOf" srcId="{9707381C-34A2-465B-8DC7-DCE55ABDB5EB}" destId="{CEAE85F0-0FF2-45A6-BA7C-65AF046EBB83}" srcOrd="0" destOrd="0" presId="urn:microsoft.com/office/officeart/2005/8/layout/hierarchy2"/>
-    <dgm:cxn modelId="{6CAE4015-57B5-456A-A866-16880F3B93ED}" type="presOf" srcId="{B91E6EC0-8555-4AD4-8850-1CF60EA014EC}" destId="{5DE9C18F-828A-4F28-821F-FF3CB0C2E9FE}" srcOrd="0" destOrd="0" presId="urn:microsoft.com/office/officeart/2005/8/layout/hierarchy2"/>
-    <dgm:cxn modelId="{86D44419-11AA-4A3E-A495-83844467DDC0}" type="presOf" srcId="{F7F956B1-0B4F-4BD2-B0FE-7CE93E5F076E}" destId="{70C472DB-8543-4760-B2F5-E310B1D77771}" srcOrd="1" destOrd="0" presId="urn:microsoft.com/office/officeart/2005/8/layout/hierarchy2"/>
-    <dgm:cxn modelId="{CB6ADC1C-8E2C-4D41-A8E2-09D329BEBC76}" type="presOf" srcId="{F7357B37-0413-4030-87F3-C6B5E9FC5B98}" destId="{ECC875B4-871B-4168-898B-298509B5EB54}" srcOrd="1" destOrd="0" presId="urn:microsoft.com/office/officeart/2005/8/layout/hierarchy2"/>
-    <dgm:cxn modelId="{E675511E-F250-4F06-9800-ECE0844805E9}" type="presOf" srcId="{FCD01281-07FA-42DE-B25B-4D3FDDAEF940}" destId="{6BB739E6-5487-45AB-BDF0-F1E198EAD768}" srcOrd="0" destOrd="0" presId="urn:microsoft.com/office/officeart/2005/8/layout/hierarchy2"/>
-    <dgm:cxn modelId="{3E7BF921-6A68-428F-9CFF-6BE6A4F646E8}" srcId="{6B547BE3-08F4-403C-8E93-8CE9C9C3426C}" destId="{3CBF230D-AE9D-45F9-B1E3-101B3E987F27}" srcOrd="0" destOrd="0" parTransId="{3216ED5A-322F-48C5-A5D8-B4CE2447C8CA}" sibTransId="{55032BA6-0D0C-4136-B13F-9B0D26A8CED9}"/>
-    <dgm:cxn modelId="{EDE5A824-DD91-4B92-9B18-1233B537093F}" type="presOf" srcId="{BEB9F2E8-6AD7-48EF-B109-54827D9B5320}" destId="{2B114A4A-DEE2-4DEE-BC6D-E67B7CD79C39}" srcOrd="1" destOrd="0" presId="urn:microsoft.com/office/officeart/2005/8/layout/hierarchy2"/>
-    <dgm:cxn modelId="{4D9BFD28-55C8-434E-87D2-060D29B798F6}" type="presOf" srcId="{ADBDA4B8-1CC5-4C95-999B-0B604C70B25C}" destId="{BBD73EE9-6D50-444B-B129-CA01784D5EB7}" srcOrd="0" destOrd="0" presId="urn:microsoft.com/office/officeart/2005/8/layout/hierarchy2"/>
-    <dgm:cxn modelId="{24764D2C-E3AA-4ADD-9CDC-3CF302CE0633}" type="presOf" srcId="{F2660733-B19B-4C8B-ADEC-444625FE1959}" destId="{4E8AA63B-77B3-4B4E-9ACE-A4694C393D1F}" srcOrd="0" destOrd="0" presId="urn:microsoft.com/office/officeart/2005/8/layout/hierarchy2"/>
-    <dgm:cxn modelId="{2AE0F42D-BEFE-4781-811E-EFF4FE5D26C3}" type="presOf" srcId="{6B547BE3-08F4-403C-8E93-8CE9C9C3426C}" destId="{B709CC8E-B85E-4857-A489-3E9FF83B1A51}" srcOrd="0" destOrd="0" presId="urn:microsoft.com/office/officeart/2005/8/layout/hierarchy2"/>
-    <dgm:cxn modelId="{D80D982E-074D-4F63-9EE4-81431C475D9D}" type="presOf" srcId="{7F18F1C7-64D6-41A1-8F9A-C4BD14DDC8DD}" destId="{7D428C10-1AC0-4BE3-A697-ED6BD860F5CA}" srcOrd="0" destOrd="0" presId="urn:microsoft.com/office/officeart/2005/8/layout/hierarchy2"/>
     <dgm:cxn modelId="{50C6B730-68F1-4661-937D-9B4FB155131C}" srcId="{9707381C-34A2-465B-8DC7-DCE55ABDB5EB}" destId="{ADBDA4B8-1CC5-4C95-999B-0B604C70B25C}" srcOrd="1" destOrd="0" parTransId="{F7357B37-0413-4030-87F3-C6B5E9FC5B98}" sibTransId="{F5342C4D-7611-4F78-9195-001780ACEF46}"/>
     <dgm:cxn modelId="{3BC7A331-D611-4AE5-B43C-157FF0F30F06}" type="presOf" srcId="{BEB9F2E8-6AD7-48EF-B109-54827D9B5320}" destId="{D01FFC91-2FF3-476C-BC20-FDFA916FA11C}" srcOrd="0" destOrd="0" presId="urn:microsoft.com/office/officeart/2005/8/layout/hierarchy2"/>
-    <dgm:cxn modelId="{0464B431-8205-44F1-8723-9DE005B5C3D5}" type="presOf" srcId="{FD1EE688-04C6-4B9C-BBF4-0AFA3A5DC1AB}" destId="{B2BB8CBF-F428-42F5-A604-AAB92BB27DD7}" srcOrd="0" destOrd="0" presId="urn:microsoft.com/office/officeart/2005/8/layout/hierarchy2"/>
+    <dgm:cxn modelId="{4C32E4FD-60CA-496E-816A-32738B7D9D89}" srcId="{FD1EE688-04C6-4B9C-BBF4-0AFA3A5DC1AB}" destId="{E94AF387-BD98-47BA-8CED-E6E8F70BDAE9}" srcOrd="1" destOrd="0" parTransId="{F2660733-B19B-4C8B-ADEC-444625FE1959}" sibTransId="{B7A443CB-EF04-4C88-AA54-1B89BBF3C939}"/>
+    <dgm:cxn modelId="{D87609B8-343D-4A18-BAA4-DB4FD0291027}" type="presOf" srcId="{F7F956B1-0B4F-4BD2-B0FE-7CE93E5F076E}" destId="{440453D6-FD36-4A5E-8970-9AD4C4BEA5F5}" srcOrd="0" destOrd="0" presId="urn:microsoft.com/office/officeart/2005/8/layout/hierarchy2"/>
     <dgm:cxn modelId="{72162237-B1C8-49C7-9DD3-31A51B3F3AB3}" type="presOf" srcId="{3CBF230D-AE9D-45F9-B1E3-101B3E987F27}" destId="{1DDB5E9E-D31F-47DA-B38A-B037B72107C5}" srcOrd="0" destOrd="0" presId="urn:microsoft.com/office/officeart/2005/8/layout/hierarchy2"/>
-    <dgm:cxn modelId="{F6533638-EB49-4EA5-B2FC-2D7926E6CE06}" srcId="{CE7183E0-FC6D-482D-BBAA-3689A7D63D08}" destId="{9707381C-34A2-465B-8DC7-DCE55ABDB5EB}" srcOrd="1" destOrd="0" parTransId="{4389E12C-9709-407B-8408-71774DA065A9}" sibTransId="{673AA035-C8BA-4786-B5EC-D26501BA52F6}"/>
-    <dgm:cxn modelId="{2C05D639-8E70-435C-8A20-A974920A2B5E}" type="presOf" srcId="{42265CA6-5503-4328-83B4-67FBEE37AF39}" destId="{C97AE997-3481-42E1-9835-076702BC81A6}" srcOrd="1" destOrd="0" presId="urn:microsoft.com/office/officeart/2005/8/layout/hierarchy2"/>
+    <dgm:cxn modelId="{F47DD768-307B-4539-BE0E-D4E8A596611F}" srcId="{CE7183E0-FC6D-482D-BBAA-3689A7D63D08}" destId="{6B547BE3-08F4-403C-8E93-8CE9C9C3426C}" srcOrd="2" destOrd="0" parTransId="{B91E6EC0-8555-4AD4-8850-1CF60EA014EC}" sibTransId="{583418CD-B905-4955-B722-7679ED341E09}"/>
+    <dgm:cxn modelId="{8A87148A-5CC0-414C-B884-FC4AD1BFCCC1}" type="presOf" srcId="{B91E6EC0-8555-4AD4-8850-1CF60EA014EC}" destId="{94765D40-7092-49D3-8469-BB86B82499D0}" srcOrd="1" destOrd="0" presId="urn:microsoft.com/office/officeart/2005/8/layout/hierarchy2"/>
+    <dgm:cxn modelId="{E675511E-F250-4F06-9800-ECE0844805E9}" type="presOf" srcId="{FCD01281-07FA-42DE-B25B-4D3FDDAEF940}" destId="{6BB739E6-5487-45AB-BDF0-F1E198EAD768}" srcOrd="0" destOrd="0" presId="urn:microsoft.com/office/officeart/2005/8/layout/hierarchy2"/>
+    <dgm:cxn modelId="{71E01497-75B1-45EA-87B3-9132E4E0E5D4}" type="presOf" srcId="{3216ED5A-322F-48C5-A5D8-B4CE2447C8CA}" destId="{0002987A-1CBC-4917-9141-161305AD6209}" srcOrd="1" destOrd="0" presId="urn:microsoft.com/office/officeart/2005/8/layout/hierarchy2"/>
+    <dgm:cxn modelId="{F49C1D73-4BA2-48C7-AF14-7116ECF26E96}" srcId="{FCD01281-07FA-42DE-B25B-4D3FDDAEF940}" destId="{CE7183E0-FC6D-482D-BBAA-3689A7D63D08}" srcOrd="0" destOrd="0" parTransId="{284FB601-27BA-4510-8087-BF223385FFFB}" sibTransId="{3F064F3A-E4B3-4B3D-A961-1815905CAB79}"/>
+    <dgm:cxn modelId="{CB6ADC1C-8E2C-4D41-A8E2-09D329BEBC76}" type="presOf" srcId="{F7357B37-0413-4030-87F3-C6B5E9FC5B98}" destId="{ECC875B4-871B-4168-898B-298509B5EB54}" srcOrd="1" destOrd="0" presId="urn:microsoft.com/office/officeart/2005/8/layout/hierarchy2"/>
+    <dgm:cxn modelId="{BB087FD5-3827-4A99-BA4F-BFE4911F8E85}" type="presOf" srcId="{F7357B37-0413-4030-87F3-C6B5E9FC5B98}" destId="{D1C8A5F7-9AC5-4014-8411-66FC3A986915}" srcOrd="0" destOrd="0" presId="urn:microsoft.com/office/officeart/2005/8/layout/hierarchy2"/>
     <dgm:cxn modelId="{5E31163D-0BDA-46E1-B88E-196B21246E06}" type="presOf" srcId="{E94AF387-BD98-47BA-8CED-E6E8F70BDAE9}" destId="{98C156FB-179C-4138-9113-F4EDF80778CD}" srcOrd="0" destOrd="0" presId="urn:microsoft.com/office/officeart/2005/8/layout/hierarchy2"/>
+    <dgm:cxn modelId="{022044AC-585A-4208-B887-06C933C4DF19}" type="presOf" srcId="{4389E12C-9709-407B-8408-71774DA065A9}" destId="{E03F2445-46A1-4A36-AA0B-2A91C15498A4}" srcOrd="1" destOrd="0" presId="urn:microsoft.com/office/officeart/2005/8/layout/hierarchy2"/>
+    <dgm:cxn modelId="{4D9BFD28-55C8-434E-87D2-060D29B798F6}" type="presOf" srcId="{ADBDA4B8-1CC5-4C95-999B-0B604C70B25C}" destId="{BBD73EE9-6D50-444B-B129-CA01784D5EB7}" srcOrd="0" destOrd="0" presId="urn:microsoft.com/office/officeart/2005/8/layout/hierarchy2"/>
+    <dgm:cxn modelId="{C3D834E4-58ED-4EC0-B1FE-D4FA70A6C25A}" type="presOf" srcId="{CE7183E0-FC6D-482D-BBAA-3689A7D63D08}" destId="{FC985EDB-B355-40E4-9388-10183C7599DF}" srcOrd="0" destOrd="0" presId="urn:microsoft.com/office/officeart/2005/8/layout/hierarchy2"/>
+    <dgm:cxn modelId="{24764D2C-E3AA-4ADD-9CDC-3CF302CE0633}" type="presOf" srcId="{F2660733-B19B-4C8B-ADEC-444625FE1959}" destId="{4E8AA63B-77B3-4B4E-9ACE-A4694C393D1F}" srcOrd="0" destOrd="0" presId="urn:microsoft.com/office/officeart/2005/8/layout/hierarchy2"/>
+    <dgm:cxn modelId="{32AA5D7A-DA32-414D-A87C-FD6CA8EA7967}" srcId="{CE7183E0-FC6D-482D-BBAA-3689A7D63D08}" destId="{FD1EE688-04C6-4B9C-BBF4-0AFA3A5DC1AB}" srcOrd="0" destOrd="0" parTransId="{2845D49D-8B8B-49FC-8CF9-5D029172FE8B}" sibTransId="{710A4F42-C977-4520-9100-B0F3A1011182}"/>
+    <dgm:cxn modelId="{B0FD4D8A-4D67-43F2-A658-A5E43C062886}" type="presOf" srcId="{7C7979A5-9647-45C2-9B77-E68BA3E128C5}" destId="{FC63A611-3841-46A8-A3B4-5E0A60C544BE}" srcOrd="0" destOrd="0" presId="urn:microsoft.com/office/officeart/2005/8/layout/hierarchy2"/>
+    <dgm:cxn modelId="{FA6CAB99-B0B1-4177-82E1-9E202E4FCDD8}" type="presOf" srcId="{F2660733-B19B-4C8B-ADEC-444625FE1959}" destId="{60725401-FD4B-42F1-B183-EFE9C6805CF3}" srcOrd="1" destOrd="0" presId="urn:microsoft.com/office/officeart/2005/8/layout/hierarchy2"/>
     <dgm:cxn modelId="{7B9D623F-FB5E-40FE-8D74-04695F6433B1}" type="presOf" srcId="{2845D49D-8B8B-49FC-8CF9-5D029172FE8B}" destId="{C9693C17-A025-4304-B2C2-786DF385B7D5}" srcOrd="0" destOrd="0" presId="urn:microsoft.com/office/officeart/2005/8/layout/hierarchy2"/>
-    <dgm:cxn modelId="{77D0C562-5A47-4BEA-AA78-66A83EA862AF}" type="presOf" srcId="{AFB89466-502F-48B5-8B1B-F4212116EB70}" destId="{BBF263CD-06CB-4292-83EB-8C00C91205C9}" srcOrd="0" destOrd="0" presId="urn:microsoft.com/office/officeart/2005/8/layout/hierarchy2"/>
-    <dgm:cxn modelId="{F47DD768-307B-4539-BE0E-D4E8A596611F}" srcId="{CE7183E0-FC6D-482D-BBAA-3689A7D63D08}" destId="{6B547BE3-08F4-403C-8E93-8CE9C9C3426C}" srcOrd="2" destOrd="0" parTransId="{B91E6EC0-8555-4AD4-8850-1CF60EA014EC}" sibTransId="{583418CD-B905-4955-B722-7679ED341E09}"/>
-    <dgm:cxn modelId="{F7F7704E-E4C0-40A5-9A95-4F969E0569BF}" srcId="{9707381C-34A2-465B-8DC7-DCE55ABDB5EB}" destId="{7C7979A5-9647-45C2-9B77-E68BA3E128C5}" srcOrd="0" destOrd="0" parTransId="{BEB9F2E8-6AD7-48EF-B109-54827D9B5320}" sibTransId="{74EEF1C3-79C8-473B-9458-E58DC3D89447}"/>
-    <dgm:cxn modelId="{F49C1D73-4BA2-48C7-AF14-7116ECF26E96}" srcId="{FCD01281-07FA-42DE-B25B-4D3FDDAEF940}" destId="{CE7183E0-FC6D-482D-BBAA-3689A7D63D08}" srcOrd="0" destOrd="0" parTransId="{284FB601-27BA-4510-8087-BF223385FFFB}" sibTransId="{3F064F3A-E4B3-4B3D-A961-1815905CAB79}"/>
-    <dgm:cxn modelId="{32AA5D7A-DA32-414D-A87C-FD6CA8EA7967}" srcId="{CE7183E0-FC6D-482D-BBAA-3689A7D63D08}" destId="{FD1EE688-04C6-4B9C-BBF4-0AFA3A5DC1AB}" srcOrd="0" destOrd="0" parTransId="{2845D49D-8B8B-49FC-8CF9-5D029172FE8B}" sibTransId="{710A4F42-C977-4520-9100-B0F3A1011182}"/>
-    <dgm:cxn modelId="{8A87148A-5CC0-414C-B884-FC4AD1BFCCC1}" type="presOf" srcId="{B91E6EC0-8555-4AD4-8850-1CF60EA014EC}" destId="{94765D40-7092-49D3-8469-BB86B82499D0}" srcOrd="1" destOrd="0" presId="urn:microsoft.com/office/officeart/2005/8/layout/hierarchy2"/>
-    <dgm:cxn modelId="{B0FD4D8A-4D67-43F2-A658-A5E43C062886}" type="presOf" srcId="{7C7979A5-9647-45C2-9B77-E68BA3E128C5}" destId="{FC63A611-3841-46A8-A3B4-5E0A60C544BE}" srcOrd="0" destOrd="0" presId="urn:microsoft.com/office/officeart/2005/8/layout/hierarchy2"/>
-    <dgm:cxn modelId="{8274D196-E59F-4422-A514-004D7CE5185C}" type="presOf" srcId="{3216ED5A-322F-48C5-A5D8-B4CE2447C8CA}" destId="{451D81E7-5C40-4FCA-BD7C-D723378D6FCB}" srcOrd="0" destOrd="0" presId="urn:microsoft.com/office/officeart/2005/8/layout/hierarchy2"/>
-    <dgm:cxn modelId="{71E01497-75B1-45EA-87B3-9132E4E0E5D4}" type="presOf" srcId="{3216ED5A-322F-48C5-A5D8-B4CE2447C8CA}" destId="{0002987A-1CBC-4917-9141-161305AD6209}" srcOrd="1" destOrd="0" presId="urn:microsoft.com/office/officeart/2005/8/layout/hierarchy2"/>
-    <dgm:cxn modelId="{FA6CAB99-B0B1-4177-82E1-9E202E4FCDD8}" type="presOf" srcId="{F2660733-B19B-4C8B-ADEC-444625FE1959}" destId="{60725401-FD4B-42F1-B183-EFE9C6805CF3}" srcOrd="1" destOrd="0" presId="urn:microsoft.com/office/officeart/2005/8/layout/hierarchy2"/>
+    <dgm:cxn modelId="{F34874A4-A2F5-40DA-A177-A85B07B7CE91}" type="presOf" srcId="{2845D49D-8B8B-49FC-8CF9-5D029172FE8B}" destId="{95077FC6-FE2C-4468-B2E1-AD8DB8B81A60}" srcOrd="1" destOrd="0" presId="urn:microsoft.com/office/officeart/2005/8/layout/hierarchy2"/>
+    <dgm:cxn modelId="{00CEB9F2-DD78-4DA9-AFEE-9988A151589E}" type="presOf" srcId="{4389E12C-9709-407B-8408-71774DA065A9}" destId="{A0542B67-BBCD-4FCC-8292-AE1B6154BAA6}" srcOrd="0" destOrd="0" presId="urn:microsoft.com/office/officeart/2005/8/layout/hierarchy2"/>
     <dgm:cxn modelId="{07366C9E-E819-4BAA-8D15-A947B41A83DB}" type="presOf" srcId="{42265CA6-5503-4328-83B4-67FBEE37AF39}" destId="{724109EC-7AA4-405A-A907-96E43FD46EDA}" srcOrd="0" destOrd="0" presId="urn:microsoft.com/office/officeart/2005/8/layout/hierarchy2"/>
-    <dgm:cxn modelId="{F34874A4-A2F5-40DA-A177-A85B07B7CE91}" type="presOf" srcId="{2845D49D-8B8B-49FC-8CF9-5D029172FE8B}" destId="{95077FC6-FE2C-4468-B2E1-AD8DB8B81A60}" srcOrd="1" destOrd="0" presId="urn:microsoft.com/office/officeart/2005/8/layout/hierarchy2"/>
-    <dgm:cxn modelId="{022044AC-585A-4208-B887-06C933C4DF19}" type="presOf" srcId="{4389E12C-9709-407B-8408-71774DA065A9}" destId="{E03F2445-46A1-4A36-AA0B-2A91C15498A4}" srcOrd="1" destOrd="0" presId="urn:microsoft.com/office/officeart/2005/8/layout/hierarchy2"/>
-    <dgm:cxn modelId="{D87609B8-343D-4A18-BAA4-DB4FD0291027}" type="presOf" srcId="{F7F956B1-0B4F-4BD2-B0FE-7CE93E5F076E}" destId="{440453D6-FD36-4A5E-8970-9AD4C4BEA5F5}" srcOrd="0" destOrd="0" presId="urn:microsoft.com/office/officeart/2005/8/layout/hierarchy2"/>
-    <dgm:cxn modelId="{48373DB9-B20D-4B9B-9DD7-F6C2D7AB1D21}" srcId="{6B547BE3-08F4-403C-8E93-8CE9C9C3426C}" destId="{AFB89466-502F-48B5-8B1B-F4212116EB70}" srcOrd="1" destOrd="0" parTransId="{F7F956B1-0B4F-4BD2-B0FE-7CE93E5F076E}" sibTransId="{E669B3DD-6E4C-4F23-9C5E-3DAC39CA70A0}"/>
-    <dgm:cxn modelId="{2472EBC8-1D53-406C-B663-7A802F5B27C3}" srcId="{FD1EE688-04C6-4B9C-BBF4-0AFA3A5DC1AB}" destId="{7F18F1C7-64D6-41A1-8F9A-C4BD14DDC8DD}" srcOrd="0" destOrd="0" parTransId="{42265CA6-5503-4328-83B4-67FBEE37AF39}" sibTransId="{0961F8A6-DF62-45B2-8A8B-64DE7098755B}"/>
-    <dgm:cxn modelId="{BB087FD5-3827-4A99-BA4F-BFE4911F8E85}" type="presOf" srcId="{F7357B37-0413-4030-87F3-C6B5E9FC5B98}" destId="{D1C8A5F7-9AC5-4014-8411-66FC3A986915}" srcOrd="0" destOrd="0" presId="urn:microsoft.com/office/officeart/2005/8/layout/hierarchy2"/>
-    <dgm:cxn modelId="{C3D834E4-58ED-4EC0-B1FE-D4FA70A6C25A}" type="presOf" srcId="{CE7183E0-FC6D-482D-BBAA-3689A7D63D08}" destId="{FC985EDB-B355-40E4-9388-10183C7599DF}" srcOrd="0" destOrd="0" presId="urn:microsoft.com/office/officeart/2005/8/layout/hierarchy2"/>
-    <dgm:cxn modelId="{00CEB9F2-DD78-4DA9-AFEE-9988A151589E}" type="presOf" srcId="{4389E12C-9709-407B-8408-71774DA065A9}" destId="{A0542B67-BBCD-4FCC-8292-AE1B6154BAA6}" srcOrd="0" destOrd="0" presId="urn:microsoft.com/office/officeart/2005/8/layout/hierarchy2"/>
-    <dgm:cxn modelId="{4C32E4FD-60CA-496E-816A-32738B7D9D89}" srcId="{FD1EE688-04C6-4B9C-BBF4-0AFA3A5DC1AB}" destId="{E94AF387-BD98-47BA-8CED-E6E8F70BDAE9}" srcOrd="1" destOrd="0" parTransId="{F2660733-B19B-4C8B-ADEC-444625FE1959}" sibTransId="{B7A443CB-EF04-4C88-AA54-1B89BBF3C939}"/>
     <dgm:cxn modelId="{1B7A935F-FD78-469D-9556-1973500D9CC5}" type="presParOf" srcId="{6BB739E6-5487-45AB-BDF0-F1E198EAD768}" destId="{AF338577-0C0E-4B98-B7AB-901DF3BE9B79}" srcOrd="0" destOrd="0" presId="urn:microsoft.com/office/officeart/2005/8/layout/hierarchy2"/>
     <dgm:cxn modelId="{CAAEE5A3-D44A-49BE-A9FE-BC95F5432F35}" type="presParOf" srcId="{AF338577-0C0E-4B98-B7AB-901DF3BE9B79}" destId="{FC985EDB-B355-40E4-9388-10183C7599DF}" srcOrd="0" destOrd="0" presId="urn:microsoft.com/office/officeart/2005/8/layout/hierarchy2"/>
     <dgm:cxn modelId="{8F164D9B-159F-41F9-B8A7-13F689C83E57}" type="presParOf" srcId="{AF338577-0C0E-4B98-B7AB-901DF3BE9B79}" destId="{B2553A53-8B7C-4A9C-8965-1592D34069B8}" srcOrd="1" destOrd="0" presId="urn:microsoft.com/office/officeart/2005/8/layout/hierarchy2"/>
@@ -2640,7 +2863,7 @@
         </a:bodyPr>
         <a:lstStyle/>
         <a:p>
-          <a:pPr marL="0" lvl="0" indent="0" algn="ctr" defTabSz="1066800">
+          <a:pPr lvl="0" algn="ctr" defTabSz="1066800">
             <a:lnSpc>
               <a:spcPct val="90000"/>
             </a:lnSpc>
@@ -2650,7 +2873,6 @@
             <a:spcAft>
               <a:spcPct val="35000"/>
             </a:spcAft>
-            <a:buNone/>
           </a:pPr>
           <a:r>
             <a:rPr lang="en-US" sz="2400" b="1" i="0" kern="1200" dirty="0">
@@ -2737,7 +2959,7 @@
         </a:bodyPr>
         <a:lstStyle/>
         <a:p>
-          <a:pPr marL="0" lvl="0" indent="0" algn="ctr" defTabSz="222250">
+          <a:pPr lvl="0" algn="ctr" defTabSz="222250">
             <a:lnSpc>
               <a:spcPct val="90000"/>
             </a:lnSpc>
@@ -2747,7 +2969,6 @@
             <a:spcAft>
               <a:spcPct val="35000"/>
             </a:spcAft>
-            <a:buNone/>
           </a:pPr>
           <a:endParaRPr lang="zh-CN" altLang="en-US" sz="500" kern="1200"/>
         </a:p>
@@ -2814,7 +3035,7 @@
         </a:bodyPr>
         <a:lstStyle/>
         <a:p>
-          <a:pPr marL="0" lvl="0" indent="0" algn="ctr" defTabSz="889000">
+          <a:pPr lvl="0" algn="ctr" defTabSz="889000">
             <a:lnSpc>
               <a:spcPct val="90000"/>
             </a:lnSpc>
@@ -2824,7 +3045,6 @@
             <a:spcAft>
               <a:spcPct val="35000"/>
             </a:spcAft>
-            <a:buNone/>
           </a:pPr>
           <a:r>
             <a:rPr lang="en-US" altLang="zh-CN" sz="2000" b="1" kern="1200" dirty="0">
@@ -2925,7 +3145,7 @@
         </a:bodyPr>
         <a:lstStyle/>
         <a:p>
-          <a:pPr marL="0" lvl="0" indent="0" algn="ctr" defTabSz="222250">
+          <a:pPr lvl="0" algn="ctr" defTabSz="222250">
             <a:lnSpc>
               <a:spcPct val="90000"/>
             </a:lnSpc>
@@ -2935,7 +3155,6 @@
             <a:spcAft>
               <a:spcPct val="35000"/>
             </a:spcAft>
-            <a:buNone/>
           </a:pPr>
           <a:endParaRPr lang="zh-CN" altLang="en-US" sz="500" kern="1200"/>
         </a:p>
@@ -3002,7 +3221,7 @@
         </a:bodyPr>
         <a:lstStyle/>
         <a:p>
-          <a:pPr marL="0" lvl="0" indent="0" algn="ctr" defTabSz="444500">
+          <a:pPr lvl="0" algn="ctr" defTabSz="444500">
             <a:lnSpc>
               <a:spcPct val="90000"/>
             </a:lnSpc>
@@ -3012,8 +3231,17 @@
             <a:spcAft>
               <a:spcPct val="35000"/>
             </a:spcAft>
-            <a:buNone/>
           </a:pPr>
+          <a:r>
+            <a:rPr lang="en-US" altLang="zh-CN" sz="1000" kern="1200" dirty="0" smtClean="0">
+              <a:solidFill>
+                <a:schemeClr val="bg2">
+                  <a:lumMod val="95000"/>
+                </a:schemeClr>
+              </a:solidFill>
+            </a:rPr>
+            <a:t>An algorithm to diagnose skin cancer </a:t>
+          </a:r>
           <a:endParaRPr lang="zh-CN" altLang="en-US" sz="1000" kern="1200" dirty="0"/>
         </a:p>
       </dsp:txBody>
@@ -3083,7 +3311,7 @@
         </a:bodyPr>
         <a:lstStyle/>
         <a:p>
-          <a:pPr marL="0" lvl="0" indent="0" algn="ctr" defTabSz="222250">
+          <a:pPr lvl="0" algn="ctr" defTabSz="222250">
             <a:lnSpc>
               <a:spcPct val="90000"/>
             </a:lnSpc>
@@ -3093,7 +3321,6 @@
             <a:spcAft>
               <a:spcPct val="35000"/>
             </a:spcAft>
-            <a:buNone/>
           </a:pPr>
           <a:endParaRPr lang="zh-CN" altLang="en-US" sz="500" kern="1200"/>
         </a:p>
@@ -3160,7 +3387,7 @@
         </a:bodyPr>
         <a:lstStyle/>
         <a:p>
-          <a:pPr marL="0" lvl="0" indent="0" algn="ctr" defTabSz="444500">
+          <a:pPr lvl="0" algn="ctr" defTabSz="444500">
             <a:lnSpc>
               <a:spcPct val="90000"/>
             </a:lnSpc>
@@ -3170,9 +3397,18 @@
             <a:spcAft>
               <a:spcPct val="35000"/>
             </a:spcAft>
-            <a:buNone/>
           </a:pPr>
-          <a:endParaRPr lang="zh-CN" altLang="en-US" sz="1000" kern="1200"/>
+          <a:r>
+            <a:rPr lang="en-US" altLang="zh-CN" sz="1000" kern="1200" dirty="0" smtClean="0">
+              <a:solidFill>
+                <a:schemeClr val="bg2">
+                  <a:lumMod val="95000"/>
+                </a:schemeClr>
+              </a:solidFill>
+            </a:rPr>
+            <a:t>A deep learning algorithm to observe biopsy</a:t>
+          </a:r>
+          <a:endParaRPr lang="zh-CN" altLang="en-US" sz="1000" kern="1200" dirty="0"/>
         </a:p>
       </dsp:txBody>
       <dsp:txXfrm>
@@ -3241,7 +3477,7 @@
         </a:bodyPr>
         <a:lstStyle/>
         <a:p>
-          <a:pPr marL="0" lvl="0" indent="0" algn="ctr" defTabSz="222250">
+          <a:pPr lvl="0" algn="ctr" defTabSz="222250">
             <a:lnSpc>
               <a:spcPct val="90000"/>
             </a:lnSpc>
@@ -3251,7 +3487,6 @@
             <a:spcAft>
               <a:spcPct val="35000"/>
             </a:spcAft>
-            <a:buNone/>
           </a:pPr>
           <a:endParaRPr lang="zh-CN" altLang="en-US" sz="500" kern="1200"/>
         </a:p>
@@ -3318,7 +3553,7 @@
         </a:bodyPr>
         <a:lstStyle/>
         <a:p>
-          <a:pPr marL="0" lvl="0" indent="0" algn="ctr" defTabSz="889000">
+          <a:pPr lvl="0" algn="ctr" defTabSz="889000">
             <a:lnSpc>
               <a:spcPct val="90000"/>
             </a:lnSpc>
@@ -3328,7 +3563,6 @@
             <a:spcAft>
               <a:spcPct val="35000"/>
             </a:spcAft>
-            <a:buNone/>
           </a:pPr>
           <a:r>
             <a:rPr lang="en-US" altLang="zh-CN" sz="2000" b="1" kern="1200" dirty="0">
@@ -3415,7 +3649,7 @@
         </a:bodyPr>
         <a:lstStyle/>
         <a:p>
-          <a:pPr marL="0" lvl="0" indent="0" algn="ctr" defTabSz="222250">
+          <a:pPr lvl="0" algn="ctr" defTabSz="222250">
             <a:lnSpc>
               <a:spcPct val="90000"/>
             </a:lnSpc>
@@ -3425,7 +3659,6 @@
             <a:spcAft>
               <a:spcPct val="35000"/>
             </a:spcAft>
-            <a:buNone/>
           </a:pPr>
           <a:endParaRPr lang="zh-CN" altLang="en-US" sz="500" kern="1200"/>
         </a:p>
@@ -3492,7 +3725,7 @@
         </a:bodyPr>
         <a:lstStyle/>
         <a:p>
-          <a:pPr marL="0" lvl="0" indent="0" algn="ctr" defTabSz="444500">
+          <a:pPr lvl="0" algn="ctr" defTabSz="444500">
             <a:lnSpc>
               <a:spcPct val="90000"/>
             </a:lnSpc>
@@ -3502,7 +3735,6 @@
             <a:spcAft>
               <a:spcPct val="35000"/>
             </a:spcAft>
-            <a:buNone/>
           </a:pPr>
           <a:r>
             <a:rPr lang="en-US" sz="1000" b="1" i="0" kern="1200" dirty="0"/>
@@ -3577,7 +3809,7 @@
         </a:bodyPr>
         <a:lstStyle/>
         <a:p>
-          <a:pPr marL="0" lvl="0" indent="0" algn="ctr" defTabSz="222250">
+          <a:pPr lvl="0" algn="ctr" defTabSz="222250">
             <a:lnSpc>
               <a:spcPct val="90000"/>
             </a:lnSpc>
@@ -3587,7 +3819,6 @@
             <a:spcAft>
               <a:spcPct val="35000"/>
             </a:spcAft>
-            <a:buNone/>
           </a:pPr>
           <a:endParaRPr lang="zh-CN" altLang="en-US" sz="500" kern="1200"/>
         </a:p>
@@ -3654,7 +3885,7 @@
         </a:bodyPr>
         <a:lstStyle/>
         <a:p>
-          <a:pPr marL="0" lvl="0" indent="0" algn="ctr" defTabSz="444500">
+          <a:pPr lvl="0" algn="ctr" defTabSz="444500">
             <a:lnSpc>
               <a:spcPct val="90000"/>
             </a:lnSpc>
@@ -3664,7 +3895,6 @@
             <a:spcAft>
               <a:spcPct val="35000"/>
             </a:spcAft>
-            <a:buNone/>
           </a:pPr>
           <a:endParaRPr lang="zh-CN" altLang="en-US" sz="1000" kern="1200"/>
         </a:p>
@@ -3735,7 +3965,7 @@
         </a:bodyPr>
         <a:lstStyle/>
         <a:p>
-          <a:pPr marL="0" lvl="0" indent="0" algn="ctr" defTabSz="222250">
+          <a:pPr lvl="0" algn="ctr" defTabSz="222250">
             <a:lnSpc>
               <a:spcPct val="90000"/>
             </a:lnSpc>
@@ -3745,7 +3975,6 @@
             <a:spcAft>
               <a:spcPct val="35000"/>
             </a:spcAft>
-            <a:buNone/>
           </a:pPr>
           <a:endParaRPr lang="zh-CN" altLang="en-US" sz="500" kern="1200"/>
         </a:p>
@@ -3812,7 +4041,7 @@
         </a:bodyPr>
         <a:lstStyle/>
         <a:p>
-          <a:pPr marL="0" lvl="0" indent="0" algn="ctr" defTabSz="889000">
+          <a:pPr lvl="0" algn="ctr" defTabSz="889000">
             <a:lnSpc>
               <a:spcPct val="90000"/>
             </a:lnSpc>
@@ -3822,7 +4051,6 @@
             <a:spcAft>
               <a:spcPct val="35000"/>
             </a:spcAft>
-            <a:buNone/>
           </a:pPr>
           <a:r>
             <a:rPr lang="en-US" altLang="zh-CN" sz="2000" b="1" kern="1200" dirty="0">
@@ -3909,7 +4137,7 @@
         </a:bodyPr>
         <a:lstStyle/>
         <a:p>
-          <a:pPr marL="0" lvl="0" indent="0" algn="ctr" defTabSz="222250">
+          <a:pPr lvl="0" algn="ctr" defTabSz="222250">
             <a:lnSpc>
               <a:spcPct val="90000"/>
             </a:lnSpc>
@@ -3919,7 +4147,6 @@
             <a:spcAft>
               <a:spcPct val="35000"/>
             </a:spcAft>
-            <a:buNone/>
           </a:pPr>
           <a:endParaRPr lang="zh-CN" altLang="en-US" sz="500" kern="1200"/>
         </a:p>
@@ -3986,7 +4213,7 @@
         </a:bodyPr>
         <a:lstStyle/>
         <a:p>
-          <a:pPr marL="0" lvl="0" indent="0" algn="ctr" defTabSz="444500">
+          <a:pPr lvl="0" algn="ctr" defTabSz="444500">
             <a:lnSpc>
               <a:spcPct val="90000"/>
             </a:lnSpc>
@@ -3996,7 +4223,6 @@
             <a:spcAft>
               <a:spcPct val="35000"/>
             </a:spcAft>
-            <a:buNone/>
           </a:pPr>
           <a:endParaRPr lang="zh-CN" altLang="en-US" sz="1000" kern="1200"/>
         </a:p>
@@ -4067,7 +4293,7 @@
         </a:bodyPr>
         <a:lstStyle/>
         <a:p>
-          <a:pPr marL="0" lvl="0" indent="0" algn="ctr" defTabSz="222250">
+          <a:pPr lvl="0" algn="ctr" defTabSz="222250">
             <a:lnSpc>
               <a:spcPct val="90000"/>
             </a:lnSpc>
@@ -4077,7 +4303,6 @@
             <a:spcAft>
               <a:spcPct val="35000"/>
             </a:spcAft>
-            <a:buNone/>
           </a:pPr>
           <a:endParaRPr lang="zh-CN" altLang="en-US" sz="500" kern="1200"/>
         </a:p>
@@ -4144,7 +4369,7 @@
         </a:bodyPr>
         <a:lstStyle/>
         <a:p>
-          <a:pPr marL="0" lvl="0" indent="0" algn="ctr" defTabSz="444500">
+          <a:pPr lvl="0" algn="ctr" defTabSz="444500">
             <a:lnSpc>
               <a:spcPct val="90000"/>
             </a:lnSpc>
@@ -4154,7 +4379,6 @@
             <a:spcAft>
               <a:spcPct val="35000"/>
             </a:spcAft>
-            <a:buNone/>
           </a:pPr>
           <a:endParaRPr lang="zh-CN" altLang="en-US" sz="1000" kern="1200"/>
         </a:p>
@@ -5616,7 +5840,7 @@
           <a:p>
             <a:fld id="{CDA3C146-E2BA-41EA-8AE9-0C67692768F2}" type="datetimeFigureOut">
               <a:rPr lang="ru-RU" smtClean="0"/>
-              <a:t>09.08.2018</a:t>
+              <a:t>10.08.2018</a:t>
             </a:fld>
             <a:endParaRPr lang="ru-RU" dirty="0"/>
           </a:p>
@@ -5793,7 +6017,7 @@
           <a:p>
             <a:fld id="{1F7D3EB6-8099-4744-9273-C8C1DD61A2EA}" type="datetimeFigureOut">
               <a:rPr lang="ru-RU" smtClean="0"/>
-              <a:t>09.08.2018</a:t>
+              <a:t>10.08.2018</a:t>
             </a:fld>
             <a:endParaRPr lang="ru-RU" dirty="0"/>
           </a:p>
@@ -36806,7 +37030,7 @@
             <a:blip r:embed="rId2">
               <a:extLst>
                 <a:ext uri="{96DAC541-7B7A-43D3-8B79-37D633B846F1}">
-                  <asvg:svgBlip xmlns:asvg="http://schemas.microsoft.com/office/drawing/2016/SVG/main" r:embed="rId3"/>
+                  <asvg:svgBlip xmlns:asvg="http://schemas.microsoft.com/office/drawing/2016/SVG/main" xmlns="" r:embed="rId3"/>
                 </a:ext>
               </a:extLst>
             </a:blip>
@@ -47249,7 +47473,7 @@
             <a:blip r:embed="rId2">
               <a:extLst>
                 <a:ext uri="{96DAC541-7B7A-43D3-8B79-37D633B846F1}">
-                  <asvg:svgBlip xmlns:asvg="http://schemas.microsoft.com/office/drawing/2016/SVG/main" r:embed="rId3"/>
+                  <asvg:svgBlip xmlns:asvg="http://schemas.microsoft.com/office/drawing/2016/SVG/main" xmlns="" r:embed="rId3"/>
                 </a:ext>
               </a:extLst>
             </a:blip>
@@ -56183,7 +56407,7 @@
           <p:nvPr>
             <p:extLst>
               <p:ext uri="{D42A27DB-BD31-4B8C-83A1-F6EECF244321}">
-                <p14:modId xmlns:p14="http://schemas.microsoft.com/office/powerpoint/2010/main" val="1192735489"/>
+                <p14:modId xmlns:p14="http://schemas.microsoft.com/office/powerpoint/2010/main" val="1168385222"/>
               </p:ext>
             </p:extLst>
           </p:nvPr>
@@ -56339,7 +56563,7 @@
                 <a14:useLocalDpi xmlns:a14="http://schemas.microsoft.com/office/drawing/2010/main" val="0"/>
               </a:ext>
               <a:ext uri="{96DAC541-7B7A-43D3-8B79-37D633B846F1}">
-                <asvg:svgBlip xmlns:asvg="http://schemas.microsoft.com/office/drawing/2016/SVG/main" r:embed="rId3"/>
+                <asvg:svgBlip xmlns:asvg="http://schemas.microsoft.com/office/drawing/2016/SVG/main" xmlns="" r:embed="rId3"/>
               </a:ext>
             </a:extLst>
           </a:blip>

</xml_diff>